<commit_message>
An Introduction to Python
</commit_message>
<xml_diff>
--- a/Python/An Introduction to Python.pptx
+++ b/Python/An Introduction to Python.pptx
@@ -4,8 +4,17 @@
   <p:sldMasterIdLst>
     <p:sldMasterId id="2147483648" r:id="rId1"/>
   </p:sldMasterIdLst>
+  <p:notesMasterIdLst>
+    <p:notesMasterId r:id="rId9"/>
+  </p:notesMasterIdLst>
   <p:sldIdLst>
     <p:sldId id="256" r:id="rId2"/>
+    <p:sldId id="257" r:id="rId3"/>
+    <p:sldId id="258" r:id="rId4"/>
+    <p:sldId id="259" r:id="rId5"/>
+    <p:sldId id="260" r:id="rId6"/>
+    <p:sldId id="261" r:id="rId7"/>
+    <p:sldId id="262" r:id="rId8"/>
   </p:sldIdLst>
   <p:sldSz cx="12192000" cy="6858000"/>
   <p:notesSz cx="6858000" cy="9144000"/>
@@ -104,7 +113,560 @@
       </a:defRPr>
     </a:lvl9pPr>
   </p:defaultTextStyle>
+  <p:extLst>
+    <p:ext uri="{EFAFB233-063F-42B5-8137-9DF3F51BA10A}">
+      <p15:sldGuideLst xmlns:p15="http://schemas.microsoft.com/office/powerpoint/2012/main"/>
+    </p:ext>
+  </p:extLst>
 </p:presentation>
+</file>
+
+<file path=ppt/notesMasters/notesMaster1.xml><?xml version="1.0" encoding="utf-8"?>
+<p:notesMaster xmlns:a="http://schemas.openxmlformats.org/drawingml/2006/main" xmlns:r="http://schemas.openxmlformats.org/officeDocument/2006/relationships" xmlns:p="http://schemas.openxmlformats.org/presentationml/2006/main">
+  <p:cSld>
+    <p:bg>
+      <p:bgRef idx="1001">
+        <a:schemeClr val="bg1"/>
+      </p:bgRef>
+    </p:bg>
+    <p:spTree>
+      <p:nvGrpSpPr>
+        <p:cNvPr id="1" name=""/>
+        <p:cNvGrpSpPr/>
+        <p:nvPr/>
+      </p:nvGrpSpPr>
+      <p:grpSpPr>
+        <a:xfrm>
+          <a:off x="0" y="0"/>
+          <a:ext cx="0" cy="0"/>
+          <a:chOff x="0" y="0"/>
+          <a:chExt cx="0" cy="0"/>
+        </a:xfrm>
+      </p:grpSpPr>
+      <p:sp>
+        <p:nvSpPr>
+          <p:cNvPr id="2" name="Header Placeholder 1"/>
+          <p:cNvSpPr>
+            <a:spLocks noGrp="1"/>
+          </p:cNvSpPr>
+          <p:nvPr>
+            <p:ph type="hdr" sz="quarter"/>
+          </p:nvPr>
+        </p:nvSpPr>
+        <p:spPr>
+          <a:xfrm>
+            <a:off x="0" y="0"/>
+            <a:ext cx="2971800" cy="458788"/>
+          </a:xfrm>
+          <a:prstGeom prst="rect">
+            <a:avLst/>
+          </a:prstGeom>
+        </p:spPr>
+        <p:txBody>
+          <a:bodyPr vert="horz" lIns="91440" tIns="45720" rIns="91440" bIns="45720" rtlCol="0"/>
+          <a:lstStyle>
+            <a:lvl1pPr algn="l">
+              <a:defRPr sz="1200"/>
+            </a:lvl1pPr>
+          </a:lstStyle>
+          <a:p>
+            <a:endParaRPr lang="en-US"/>
+          </a:p>
+        </p:txBody>
+      </p:sp>
+      <p:sp>
+        <p:nvSpPr>
+          <p:cNvPr id="3" name="Date Placeholder 2"/>
+          <p:cNvSpPr>
+            <a:spLocks noGrp="1"/>
+          </p:cNvSpPr>
+          <p:nvPr>
+            <p:ph type="dt" idx="1"/>
+          </p:nvPr>
+        </p:nvSpPr>
+        <p:spPr>
+          <a:xfrm>
+            <a:off x="3884613" y="0"/>
+            <a:ext cx="2971800" cy="458788"/>
+          </a:xfrm>
+          <a:prstGeom prst="rect">
+            <a:avLst/>
+          </a:prstGeom>
+        </p:spPr>
+        <p:txBody>
+          <a:bodyPr vert="horz" lIns="91440" tIns="45720" rIns="91440" bIns="45720" rtlCol="0"/>
+          <a:lstStyle>
+            <a:lvl1pPr algn="r">
+              <a:defRPr sz="1200"/>
+            </a:lvl1pPr>
+          </a:lstStyle>
+          <a:p>
+            <a:fld id="{05C06D6A-696A-F84C-98EA-F95165690C43}" type="datetimeFigureOut">
+              <a:rPr lang="en-US" smtClean="0"/>
+              <a:t>10/7/22</a:t>
+            </a:fld>
+            <a:endParaRPr lang="en-US"/>
+          </a:p>
+        </p:txBody>
+      </p:sp>
+      <p:sp>
+        <p:nvSpPr>
+          <p:cNvPr id="4" name="Slide Image Placeholder 3"/>
+          <p:cNvSpPr>
+            <a:spLocks noGrp="1" noRot="1" noChangeAspect="1"/>
+          </p:cNvSpPr>
+          <p:nvPr>
+            <p:ph type="sldImg" idx="2"/>
+          </p:nvPr>
+        </p:nvSpPr>
+        <p:spPr>
+          <a:xfrm>
+            <a:off x="685800" y="1143000"/>
+            <a:ext cx="5486400" cy="3086100"/>
+          </a:xfrm>
+          <a:prstGeom prst="rect">
+            <a:avLst/>
+          </a:prstGeom>
+          <a:noFill/>
+          <a:ln w="12700">
+            <a:solidFill>
+              <a:prstClr val="black"/>
+            </a:solidFill>
+          </a:ln>
+        </p:spPr>
+        <p:txBody>
+          <a:bodyPr vert="horz" lIns="91440" tIns="45720" rIns="91440" bIns="45720" rtlCol="0" anchor="ctr"/>
+          <a:lstStyle/>
+          <a:p>
+            <a:endParaRPr lang="en-US"/>
+          </a:p>
+        </p:txBody>
+      </p:sp>
+      <p:sp>
+        <p:nvSpPr>
+          <p:cNvPr id="5" name="Notes Placeholder 4"/>
+          <p:cNvSpPr>
+            <a:spLocks noGrp="1"/>
+          </p:cNvSpPr>
+          <p:nvPr>
+            <p:ph type="body" sz="quarter" idx="3"/>
+          </p:nvPr>
+        </p:nvSpPr>
+        <p:spPr>
+          <a:xfrm>
+            <a:off x="685800" y="4400550"/>
+            <a:ext cx="5486400" cy="3600450"/>
+          </a:xfrm>
+          <a:prstGeom prst="rect">
+            <a:avLst/>
+          </a:prstGeom>
+        </p:spPr>
+        <p:txBody>
+          <a:bodyPr vert="horz" lIns="91440" tIns="45720" rIns="91440" bIns="45720" rtlCol="0"/>
+          <a:lstStyle/>
+          <a:p>
+            <a:pPr lvl="0"/>
+            <a:r>
+              <a:rPr lang="en-GB"/>
+              <a:t>Click to edit Master text styles</a:t>
+            </a:r>
+          </a:p>
+          <a:p>
+            <a:pPr lvl="1"/>
+            <a:r>
+              <a:rPr lang="en-GB"/>
+              <a:t>Second level</a:t>
+            </a:r>
+          </a:p>
+          <a:p>
+            <a:pPr lvl="2"/>
+            <a:r>
+              <a:rPr lang="en-GB"/>
+              <a:t>Third level</a:t>
+            </a:r>
+          </a:p>
+          <a:p>
+            <a:pPr lvl="3"/>
+            <a:r>
+              <a:rPr lang="en-GB"/>
+              <a:t>Fourth level</a:t>
+            </a:r>
+          </a:p>
+          <a:p>
+            <a:pPr lvl="4"/>
+            <a:r>
+              <a:rPr lang="en-GB"/>
+              <a:t>Fifth level</a:t>
+            </a:r>
+            <a:endParaRPr lang="en-US"/>
+          </a:p>
+        </p:txBody>
+      </p:sp>
+      <p:sp>
+        <p:nvSpPr>
+          <p:cNvPr id="6" name="Footer Placeholder 5"/>
+          <p:cNvSpPr>
+            <a:spLocks noGrp="1"/>
+          </p:cNvSpPr>
+          <p:nvPr>
+            <p:ph type="ftr" sz="quarter" idx="4"/>
+          </p:nvPr>
+        </p:nvSpPr>
+        <p:spPr>
+          <a:xfrm>
+            <a:off x="0" y="8685213"/>
+            <a:ext cx="2971800" cy="458787"/>
+          </a:xfrm>
+          <a:prstGeom prst="rect">
+            <a:avLst/>
+          </a:prstGeom>
+        </p:spPr>
+        <p:txBody>
+          <a:bodyPr vert="horz" lIns="91440" tIns="45720" rIns="91440" bIns="45720" rtlCol="0" anchor="b"/>
+          <a:lstStyle>
+            <a:lvl1pPr algn="l">
+              <a:defRPr sz="1200"/>
+            </a:lvl1pPr>
+          </a:lstStyle>
+          <a:p>
+            <a:endParaRPr lang="en-US"/>
+          </a:p>
+        </p:txBody>
+      </p:sp>
+      <p:sp>
+        <p:nvSpPr>
+          <p:cNvPr id="7" name="Slide Number Placeholder 6"/>
+          <p:cNvSpPr>
+            <a:spLocks noGrp="1"/>
+          </p:cNvSpPr>
+          <p:nvPr>
+            <p:ph type="sldNum" sz="quarter" idx="5"/>
+          </p:nvPr>
+        </p:nvSpPr>
+        <p:spPr>
+          <a:xfrm>
+            <a:off x="3884613" y="8685213"/>
+            <a:ext cx="2971800" cy="458787"/>
+          </a:xfrm>
+          <a:prstGeom prst="rect">
+            <a:avLst/>
+          </a:prstGeom>
+        </p:spPr>
+        <p:txBody>
+          <a:bodyPr vert="horz" lIns="91440" tIns="45720" rIns="91440" bIns="45720" rtlCol="0" anchor="b"/>
+          <a:lstStyle>
+            <a:lvl1pPr algn="r">
+              <a:defRPr sz="1200"/>
+            </a:lvl1pPr>
+          </a:lstStyle>
+          <a:p>
+            <a:fld id="{B14EDDFC-4FC9-6E4A-B48C-4ABF959538BA}" type="slidenum">
+              <a:rPr lang="en-US" smtClean="0"/>
+              <a:t>‹#›</a:t>
+            </a:fld>
+            <a:endParaRPr lang="en-US"/>
+          </a:p>
+        </p:txBody>
+      </p:sp>
+    </p:spTree>
+    <p:extLst>
+      <p:ext uri="{BB962C8B-B14F-4D97-AF65-F5344CB8AC3E}">
+        <p14:creationId xmlns:p14="http://schemas.microsoft.com/office/powerpoint/2010/main" val="2647275071"/>
+      </p:ext>
+    </p:extLst>
+  </p:cSld>
+  <p:clrMap bg1="lt1" tx1="dk1" bg2="lt2" tx2="dk2" accent1="accent1" accent2="accent2" accent3="accent3" accent4="accent4" accent5="accent5" accent6="accent6" hlink="hlink" folHlink="folHlink"/>
+  <p:notesStyle>
+    <a:lvl1pPr marL="0" algn="l" defTabSz="914400" rtl="0" eaLnBrk="1" latinLnBrk="0" hangingPunct="1">
+      <a:defRPr sz="1200" kern="1200">
+        <a:solidFill>
+          <a:schemeClr val="tx1"/>
+        </a:solidFill>
+        <a:latin typeface="+mn-lt"/>
+        <a:ea typeface="+mn-ea"/>
+        <a:cs typeface="+mn-cs"/>
+      </a:defRPr>
+    </a:lvl1pPr>
+    <a:lvl2pPr marL="457200" algn="l" defTabSz="914400" rtl="0" eaLnBrk="1" latinLnBrk="0" hangingPunct="1">
+      <a:defRPr sz="1200" kern="1200">
+        <a:solidFill>
+          <a:schemeClr val="tx1"/>
+        </a:solidFill>
+        <a:latin typeface="+mn-lt"/>
+        <a:ea typeface="+mn-ea"/>
+        <a:cs typeface="+mn-cs"/>
+      </a:defRPr>
+    </a:lvl2pPr>
+    <a:lvl3pPr marL="914400" algn="l" defTabSz="914400" rtl="0" eaLnBrk="1" latinLnBrk="0" hangingPunct="1">
+      <a:defRPr sz="1200" kern="1200">
+        <a:solidFill>
+          <a:schemeClr val="tx1"/>
+        </a:solidFill>
+        <a:latin typeface="+mn-lt"/>
+        <a:ea typeface="+mn-ea"/>
+        <a:cs typeface="+mn-cs"/>
+      </a:defRPr>
+    </a:lvl3pPr>
+    <a:lvl4pPr marL="1371600" algn="l" defTabSz="914400" rtl="0" eaLnBrk="1" latinLnBrk="0" hangingPunct="1">
+      <a:defRPr sz="1200" kern="1200">
+        <a:solidFill>
+          <a:schemeClr val="tx1"/>
+        </a:solidFill>
+        <a:latin typeface="+mn-lt"/>
+        <a:ea typeface="+mn-ea"/>
+        <a:cs typeface="+mn-cs"/>
+      </a:defRPr>
+    </a:lvl4pPr>
+    <a:lvl5pPr marL="1828800" algn="l" defTabSz="914400" rtl="0" eaLnBrk="1" latinLnBrk="0" hangingPunct="1">
+      <a:defRPr sz="1200" kern="1200">
+        <a:solidFill>
+          <a:schemeClr val="tx1"/>
+        </a:solidFill>
+        <a:latin typeface="+mn-lt"/>
+        <a:ea typeface="+mn-ea"/>
+        <a:cs typeface="+mn-cs"/>
+      </a:defRPr>
+    </a:lvl5pPr>
+    <a:lvl6pPr marL="2286000" algn="l" defTabSz="914400" rtl="0" eaLnBrk="1" latinLnBrk="0" hangingPunct="1">
+      <a:defRPr sz="1200" kern="1200">
+        <a:solidFill>
+          <a:schemeClr val="tx1"/>
+        </a:solidFill>
+        <a:latin typeface="+mn-lt"/>
+        <a:ea typeface="+mn-ea"/>
+        <a:cs typeface="+mn-cs"/>
+      </a:defRPr>
+    </a:lvl6pPr>
+    <a:lvl7pPr marL="2743200" algn="l" defTabSz="914400" rtl="0" eaLnBrk="1" latinLnBrk="0" hangingPunct="1">
+      <a:defRPr sz="1200" kern="1200">
+        <a:solidFill>
+          <a:schemeClr val="tx1"/>
+        </a:solidFill>
+        <a:latin typeface="+mn-lt"/>
+        <a:ea typeface="+mn-ea"/>
+        <a:cs typeface="+mn-cs"/>
+      </a:defRPr>
+    </a:lvl7pPr>
+    <a:lvl8pPr marL="3200400" algn="l" defTabSz="914400" rtl="0" eaLnBrk="1" latinLnBrk="0" hangingPunct="1">
+      <a:defRPr sz="1200" kern="1200">
+        <a:solidFill>
+          <a:schemeClr val="tx1"/>
+        </a:solidFill>
+        <a:latin typeface="+mn-lt"/>
+        <a:ea typeface="+mn-ea"/>
+        <a:cs typeface="+mn-cs"/>
+      </a:defRPr>
+    </a:lvl8pPr>
+    <a:lvl9pPr marL="3657600" algn="l" defTabSz="914400" rtl="0" eaLnBrk="1" latinLnBrk="0" hangingPunct="1">
+      <a:defRPr sz="1200" kern="1200">
+        <a:solidFill>
+          <a:schemeClr val="tx1"/>
+        </a:solidFill>
+        <a:latin typeface="+mn-lt"/>
+        <a:ea typeface="+mn-ea"/>
+        <a:cs typeface="+mn-cs"/>
+      </a:defRPr>
+    </a:lvl9pPr>
+  </p:notesStyle>
+</p:notesMaster>
+</file>
+
+<file path=ppt/notesSlides/notesSlide1.xml><?xml version="1.0" encoding="utf-8"?>
+<p:notes xmlns:a="http://schemas.openxmlformats.org/drawingml/2006/main" xmlns:r="http://schemas.openxmlformats.org/officeDocument/2006/relationships" xmlns:p="http://schemas.openxmlformats.org/presentationml/2006/main">
+  <p:cSld>
+    <p:spTree>
+      <p:nvGrpSpPr>
+        <p:cNvPr id="1" name=""/>
+        <p:cNvGrpSpPr/>
+        <p:nvPr/>
+      </p:nvGrpSpPr>
+      <p:grpSpPr>
+        <a:xfrm>
+          <a:off x="0" y="0"/>
+          <a:ext cx="0" cy="0"/>
+          <a:chOff x="0" y="0"/>
+          <a:chExt cx="0" cy="0"/>
+        </a:xfrm>
+      </p:grpSpPr>
+      <p:sp>
+        <p:nvSpPr>
+          <p:cNvPr id="2" name="Slide Image Placeholder 1"/>
+          <p:cNvSpPr>
+            <a:spLocks noGrp="1" noRot="1" noChangeAspect="1"/>
+          </p:cNvSpPr>
+          <p:nvPr>
+            <p:ph type="sldImg"/>
+          </p:nvPr>
+        </p:nvSpPr>
+        <p:spPr/>
+      </p:sp>
+      <p:sp>
+        <p:nvSpPr>
+          <p:cNvPr id="3" name="Notes Placeholder 2"/>
+          <p:cNvSpPr>
+            <a:spLocks noGrp="1"/>
+          </p:cNvSpPr>
+          <p:nvPr>
+            <p:ph type="body" idx="1"/>
+          </p:nvPr>
+        </p:nvSpPr>
+        <p:spPr/>
+        <p:txBody>
+          <a:bodyPr/>
+          <a:lstStyle/>
+          <a:p>
+            <a:r>
+              <a:rPr lang="en-IN" b="0" i="0" dirty="0">
+                <a:solidFill>
+                  <a:srgbClr val="202124"/>
+                </a:solidFill>
+                <a:effectLst/>
+                <a:latin typeface="arial" panose="020B0604020202020204" pitchFamily="34" charset="0"/>
+              </a:rPr>
+              <a:t>Python is a general-purpose language, meaning it can be used to create a variety of different programs and isn't specialized for any specific problems.</a:t>
+            </a:r>
+            <a:endParaRPr lang="en-US" dirty="0"/>
+          </a:p>
+        </p:txBody>
+      </p:sp>
+      <p:sp>
+        <p:nvSpPr>
+          <p:cNvPr id="4" name="Slide Number Placeholder 3"/>
+          <p:cNvSpPr>
+            <a:spLocks noGrp="1"/>
+          </p:cNvSpPr>
+          <p:nvPr>
+            <p:ph type="sldNum" sz="quarter" idx="5"/>
+          </p:nvPr>
+        </p:nvSpPr>
+        <p:spPr/>
+        <p:txBody>
+          <a:bodyPr/>
+          <a:lstStyle/>
+          <a:p>
+            <a:fld id="{B14EDDFC-4FC9-6E4A-B48C-4ABF959538BA}" type="slidenum">
+              <a:rPr lang="en-US" smtClean="0"/>
+              <a:t>4</a:t>
+            </a:fld>
+            <a:endParaRPr lang="en-US"/>
+          </a:p>
+        </p:txBody>
+      </p:sp>
+    </p:spTree>
+    <p:extLst>
+      <p:ext uri="{BB962C8B-B14F-4D97-AF65-F5344CB8AC3E}">
+        <p14:creationId xmlns:p14="http://schemas.microsoft.com/office/powerpoint/2010/main" val="1742804310"/>
+      </p:ext>
+    </p:extLst>
+  </p:cSld>
+  <p:clrMapOvr>
+    <a:masterClrMapping/>
+  </p:clrMapOvr>
+</p:notes>
+</file>
+
+<file path=ppt/notesSlides/notesSlide2.xml><?xml version="1.0" encoding="utf-8"?>
+<p:notes xmlns:a="http://schemas.openxmlformats.org/drawingml/2006/main" xmlns:r="http://schemas.openxmlformats.org/officeDocument/2006/relationships" xmlns:p="http://schemas.openxmlformats.org/presentationml/2006/main">
+  <p:cSld>
+    <p:spTree>
+      <p:nvGrpSpPr>
+        <p:cNvPr id="1" name=""/>
+        <p:cNvGrpSpPr/>
+        <p:nvPr/>
+      </p:nvGrpSpPr>
+      <p:grpSpPr>
+        <a:xfrm>
+          <a:off x="0" y="0"/>
+          <a:ext cx="0" cy="0"/>
+          <a:chOff x="0" y="0"/>
+          <a:chExt cx="0" cy="0"/>
+        </a:xfrm>
+      </p:grpSpPr>
+      <p:sp>
+        <p:nvSpPr>
+          <p:cNvPr id="2" name="Slide Image Placeholder 1"/>
+          <p:cNvSpPr>
+            <a:spLocks noGrp="1" noRot="1" noChangeAspect="1"/>
+          </p:cNvSpPr>
+          <p:nvPr>
+            <p:ph type="sldImg"/>
+          </p:nvPr>
+        </p:nvSpPr>
+        <p:spPr/>
+      </p:sp>
+      <p:sp>
+        <p:nvSpPr>
+          <p:cNvPr id="3" name="Notes Placeholder 2"/>
+          <p:cNvSpPr>
+            <a:spLocks noGrp="1"/>
+          </p:cNvSpPr>
+          <p:nvPr>
+            <p:ph type="body" idx="1"/>
+          </p:nvPr>
+        </p:nvSpPr>
+        <p:spPr/>
+        <p:txBody>
+          <a:bodyPr/>
+          <a:lstStyle/>
+          <a:p>
+            <a:r>
+              <a:rPr lang="en-IN" b="1" i="0" dirty="0">
+                <a:solidFill>
+                  <a:srgbClr val="202124"/>
+                </a:solidFill>
+                <a:effectLst/>
+                <a:latin typeface="arial" panose="020B0604020202020204" pitchFamily="34" charset="0"/>
+              </a:rPr>
+              <a:t>Python is an interpreted and dynamically typed language, whereas Java is a compiled and statically typed language</a:t>
+            </a:r>
+            <a:r>
+              <a:rPr lang="en-IN" b="0" i="0" dirty="0">
+                <a:solidFill>
+                  <a:srgbClr val="202124"/>
+                </a:solidFill>
+                <a:effectLst/>
+                <a:latin typeface="arial" panose="020B0604020202020204" pitchFamily="34" charset="0"/>
+              </a:rPr>
+              <a:t>. Python code doesn't need to be compiled before being run. Java code, on the other hand, needs to be compiled from code readable by humans to code readable by the machine.</a:t>
+            </a:r>
+            <a:endParaRPr lang="en-US" dirty="0"/>
+          </a:p>
+        </p:txBody>
+      </p:sp>
+      <p:sp>
+        <p:nvSpPr>
+          <p:cNvPr id="4" name="Slide Number Placeholder 3"/>
+          <p:cNvSpPr>
+            <a:spLocks noGrp="1"/>
+          </p:cNvSpPr>
+          <p:nvPr>
+            <p:ph type="sldNum" sz="quarter" idx="5"/>
+          </p:nvPr>
+        </p:nvSpPr>
+        <p:spPr/>
+        <p:txBody>
+          <a:bodyPr/>
+          <a:lstStyle/>
+          <a:p>
+            <a:fld id="{B14EDDFC-4FC9-6E4A-B48C-4ABF959538BA}" type="slidenum">
+              <a:rPr lang="en-US" smtClean="0"/>
+              <a:t>6</a:t>
+            </a:fld>
+            <a:endParaRPr lang="en-US"/>
+          </a:p>
+        </p:txBody>
+      </p:sp>
+    </p:spTree>
+    <p:extLst>
+      <p:ext uri="{BB962C8B-B14F-4D97-AF65-F5344CB8AC3E}">
+        <p14:creationId xmlns:p14="http://schemas.microsoft.com/office/powerpoint/2010/main" val="2577216920"/>
+      </p:ext>
+    </p:extLst>
+  </p:cSld>
+  <p:clrMapOvr>
+    <a:masterClrMapping/>
+  </p:clrMapOvr>
+</p:notes>
 </file>
 
 <file path=ppt/slideLayouts/slideLayout1.xml><?xml version="1.0" encoding="utf-8"?>
@@ -254,9 +816,9 @@
           <a:bodyPr/>
           <a:lstStyle/>
           <a:p>
-            <a:fld id="{675B978A-D435-DC4F-894C-66BF94008816}" type="datetimeFigureOut">
-              <a:rPr lang="en-US" smtClean="0"/>
-              <a:t>10/7/22</a:t>
+            <a:fld id="{51DFC8C1-844F-3F49-BDF9-5A658CD4A85B}" type="datetime1">
+              <a:rPr lang="en-IN" smtClean="0"/>
+              <a:t>07/10/22</a:t>
             </a:fld>
             <a:endParaRPr lang="en-US"/>
           </a:p>
@@ -283,7 +845,10 @@
           <a:bodyPr/>
           <a:lstStyle/>
           <a:p>
-            <a:endParaRPr lang="en-US"/>
+            <a:r>
+              <a:rPr lang="en-US"/>
+              <a:t>Rhash Algo</a:t>
+            </a:r>
           </a:p>
         </p:txBody>
       </p:sp>
@@ -454,9 +1019,9 @@
           <a:bodyPr/>
           <a:lstStyle/>
           <a:p>
-            <a:fld id="{675B978A-D435-DC4F-894C-66BF94008816}" type="datetimeFigureOut">
-              <a:rPr lang="en-US" smtClean="0"/>
-              <a:t>10/7/22</a:t>
+            <a:fld id="{6ADFC85C-62C2-2E4C-9DB8-DD17A42A0BEF}" type="datetime1">
+              <a:rPr lang="en-IN" smtClean="0"/>
+              <a:t>07/10/22</a:t>
             </a:fld>
             <a:endParaRPr lang="en-US"/>
           </a:p>
@@ -483,7 +1048,10 @@
           <a:bodyPr/>
           <a:lstStyle/>
           <a:p>
-            <a:endParaRPr lang="en-US"/>
+            <a:r>
+              <a:rPr lang="en-US"/>
+              <a:t>Rhash Algo</a:t>
+            </a:r>
           </a:p>
         </p:txBody>
       </p:sp>
@@ -664,9 +1232,9 @@
           <a:bodyPr/>
           <a:lstStyle/>
           <a:p>
-            <a:fld id="{675B978A-D435-DC4F-894C-66BF94008816}" type="datetimeFigureOut">
-              <a:rPr lang="en-US" smtClean="0"/>
-              <a:t>10/7/22</a:t>
+            <a:fld id="{085406C8-D18E-C540-A9C9-8ECB587189BF}" type="datetime1">
+              <a:rPr lang="en-IN" smtClean="0"/>
+              <a:t>07/10/22</a:t>
             </a:fld>
             <a:endParaRPr lang="en-US"/>
           </a:p>
@@ -693,7 +1261,10 @@
           <a:bodyPr/>
           <a:lstStyle/>
           <a:p>
-            <a:endParaRPr lang="en-US"/>
+            <a:r>
+              <a:rPr lang="en-US"/>
+              <a:t>Rhash Algo</a:t>
+            </a:r>
           </a:p>
         </p:txBody>
       </p:sp>
@@ -864,9 +1435,9 @@
           <a:bodyPr/>
           <a:lstStyle/>
           <a:p>
-            <a:fld id="{675B978A-D435-DC4F-894C-66BF94008816}" type="datetimeFigureOut">
-              <a:rPr lang="en-US" smtClean="0"/>
-              <a:t>10/7/22</a:t>
+            <a:fld id="{C422E92E-4B63-F541-8666-75B94BDF48C0}" type="datetime1">
+              <a:rPr lang="en-IN" smtClean="0"/>
+              <a:t>07/10/22</a:t>
             </a:fld>
             <a:endParaRPr lang="en-US"/>
           </a:p>
@@ -893,7 +1464,10 @@
           <a:bodyPr/>
           <a:lstStyle/>
           <a:p>
-            <a:endParaRPr lang="en-US"/>
+            <a:r>
+              <a:rPr lang="en-US"/>
+              <a:t>Rhash Algo</a:t>
+            </a:r>
           </a:p>
         </p:txBody>
       </p:sp>
@@ -1140,9 +1714,9 @@
           <a:bodyPr/>
           <a:lstStyle/>
           <a:p>
-            <a:fld id="{675B978A-D435-DC4F-894C-66BF94008816}" type="datetimeFigureOut">
-              <a:rPr lang="en-US" smtClean="0"/>
-              <a:t>10/7/22</a:t>
+            <a:fld id="{1598ABCA-57F9-A449-B66A-60D01975261A}" type="datetime1">
+              <a:rPr lang="en-IN" smtClean="0"/>
+              <a:t>07/10/22</a:t>
             </a:fld>
             <a:endParaRPr lang="en-US"/>
           </a:p>
@@ -1169,7 +1743,10 @@
           <a:bodyPr/>
           <a:lstStyle/>
           <a:p>
-            <a:endParaRPr lang="en-US"/>
+            <a:r>
+              <a:rPr lang="en-US"/>
+              <a:t>Rhash Algo</a:t>
+            </a:r>
           </a:p>
         </p:txBody>
       </p:sp>
@@ -1408,9 +1985,9 @@
           <a:bodyPr/>
           <a:lstStyle/>
           <a:p>
-            <a:fld id="{675B978A-D435-DC4F-894C-66BF94008816}" type="datetimeFigureOut">
-              <a:rPr lang="en-US" smtClean="0"/>
-              <a:t>10/7/22</a:t>
+            <a:fld id="{65D2C9BF-2147-734E-8D64-02B3F0811E1F}" type="datetime1">
+              <a:rPr lang="en-IN" smtClean="0"/>
+              <a:t>07/10/22</a:t>
             </a:fld>
             <a:endParaRPr lang="en-US"/>
           </a:p>
@@ -1437,7 +2014,10 @@
           <a:bodyPr/>
           <a:lstStyle/>
           <a:p>
-            <a:endParaRPr lang="en-US"/>
+            <a:r>
+              <a:rPr lang="en-US"/>
+              <a:t>Rhash Algo</a:t>
+            </a:r>
           </a:p>
         </p:txBody>
       </p:sp>
@@ -1823,9 +2403,9 @@
           <a:bodyPr/>
           <a:lstStyle/>
           <a:p>
-            <a:fld id="{675B978A-D435-DC4F-894C-66BF94008816}" type="datetimeFigureOut">
-              <a:rPr lang="en-US" smtClean="0"/>
-              <a:t>10/7/22</a:t>
+            <a:fld id="{E26BBA84-9A90-0446-A825-603B5136AC29}" type="datetime1">
+              <a:rPr lang="en-IN" smtClean="0"/>
+              <a:t>07/10/22</a:t>
             </a:fld>
             <a:endParaRPr lang="en-US"/>
           </a:p>
@@ -1852,7 +2432,10 @@
           <a:bodyPr/>
           <a:lstStyle/>
           <a:p>
-            <a:endParaRPr lang="en-US"/>
+            <a:r>
+              <a:rPr lang="en-US"/>
+              <a:t>Rhash Algo</a:t>
+            </a:r>
           </a:p>
         </p:txBody>
       </p:sp>
@@ -1965,9 +2548,9 @@
           <a:bodyPr/>
           <a:lstStyle/>
           <a:p>
-            <a:fld id="{675B978A-D435-DC4F-894C-66BF94008816}" type="datetimeFigureOut">
-              <a:rPr lang="en-US" smtClean="0"/>
-              <a:t>10/7/22</a:t>
+            <a:fld id="{0344927C-42DD-6248-BDC6-797DC1743B17}" type="datetime1">
+              <a:rPr lang="en-IN" smtClean="0"/>
+              <a:t>07/10/22</a:t>
             </a:fld>
             <a:endParaRPr lang="en-US"/>
           </a:p>
@@ -1994,7 +2577,10 @@
           <a:bodyPr/>
           <a:lstStyle/>
           <a:p>
-            <a:endParaRPr lang="en-US"/>
+            <a:r>
+              <a:rPr lang="en-US"/>
+              <a:t>Rhash Algo</a:t>
+            </a:r>
           </a:p>
         </p:txBody>
       </p:sp>
@@ -2078,9 +2664,9 @@
           <a:bodyPr/>
           <a:lstStyle/>
           <a:p>
-            <a:fld id="{675B978A-D435-DC4F-894C-66BF94008816}" type="datetimeFigureOut">
-              <a:rPr lang="en-US" smtClean="0"/>
-              <a:t>10/7/22</a:t>
+            <a:fld id="{C10A07B2-A688-D94C-B032-0E08B7687294}" type="datetime1">
+              <a:rPr lang="en-IN" smtClean="0"/>
+              <a:t>07/10/22</a:t>
             </a:fld>
             <a:endParaRPr lang="en-US"/>
           </a:p>
@@ -2107,7 +2693,10 @@
           <a:bodyPr/>
           <a:lstStyle/>
           <a:p>
-            <a:endParaRPr lang="en-US"/>
+            <a:r>
+              <a:rPr lang="en-US"/>
+              <a:t>Rhash Algo</a:t>
+            </a:r>
           </a:p>
         </p:txBody>
       </p:sp>
@@ -2391,9 +2980,9 @@
           <a:bodyPr/>
           <a:lstStyle/>
           <a:p>
-            <a:fld id="{675B978A-D435-DC4F-894C-66BF94008816}" type="datetimeFigureOut">
-              <a:rPr lang="en-US" smtClean="0"/>
-              <a:t>10/7/22</a:t>
+            <a:fld id="{2057E3D6-2749-4244-88AF-597F25E066FD}" type="datetime1">
+              <a:rPr lang="en-IN" smtClean="0"/>
+              <a:t>07/10/22</a:t>
             </a:fld>
             <a:endParaRPr lang="en-US"/>
           </a:p>
@@ -2420,7 +3009,10 @@
           <a:bodyPr/>
           <a:lstStyle/>
           <a:p>
-            <a:endParaRPr lang="en-US"/>
+            <a:r>
+              <a:rPr lang="en-US"/>
+              <a:t>Rhash Algo</a:t>
+            </a:r>
           </a:p>
         </p:txBody>
       </p:sp>
@@ -2680,9 +3272,9 @@
           <a:bodyPr/>
           <a:lstStyle/>
           <a:p>
-            <a:fld id="{675B978A-D435-DC4F-894C-66BF94008816}" type="datetimeFigureOut">
-              <a:rPr lang="en-US" smtClean="0"/>
-              <a:t>10/7/22</a:t>
+            <a:fld id="{0A069BAE-F0DF-B049-A3CA-F14ABB807A64}" type="datetime1">
+              <a:rPr lang="en-IN" smtClean="0"/>
+              <a:t>07/10/22</a:t>
             </a:fld>
             <a:endParaRPr lang="en-US"/>
           </a:p>
@@ -2709,7 +3301,10 @@
           <a:bodyPr/>
           <a:lstStyle/>
           <a:p>
-            <a:endParaRPr lang="en-US"/>
+            <a:r>
+              <a:rPr lang="en-US"/>
+              <a:t>Rhash Algo</a:t>
+            </a:r>
           </a:p>
         </p:txBody>
       </p:sp>
@@ -2923,9 +3518,9 @@
             </a:lvl1pPr>
           </a:lstStyle>
           <a:p>
-            <a:fld id="{675B978A-D435-DC4F-894C-66BF94008816}" type="datetimeFigureOut">
-              <a:rPr lang="en-US" smtClean="0"/>
-              <a:t>10/7/22</a:t>
+            <a:fld id="{0FD08415-8ABC-0845-8524-F570D41425C3}" type="datetime1">
+              <a:rPr lang="en-IN" smtClean="0"/>
+              <a:t>07/10/22</a:t>
             </a:fld>
             <a:endParaRPr lang="en-US"/>
           </a:p>
@@ -2970,7 +3565,10 @@
             </a:lvl1pPr>
           </a:lstStyle>
           <a:p>
-            <a:endParaRPr lang="en-US"/>
+            <a:r>
+              <a:rPr lang="en-US"/>
+              <a:t>Rhash Algo</a:t>
+            </a:r>
           </a:p>
         </p:txBody>
       </p:sp>
@@ -3042,6 +3640,7 @@
     <p:sldLayoutId id="2147483658" r:id="rId10"/>
     <p:sldLayoutId id="2147483659" r:id="rId11"/>
   </p:sldLayoutIdLst>
+  <p:hf sldNum="0" hdr="0" dt="0"/>
   <p:txStyles>
     <p:titleStyle>
       <a:lvl1pPr algn="l" defTabSz="914400" rtl="0" eaLnBrk="1" latinLnBrk="0" hangingPunct="1">
@@ -3437,10 +4036,1193 @@
           </a:p>
         </p:txBody>
       </p:sp>
+      <p:sp>
+        <p:nvSpPr>
+          <p:cNvPr id="6" name="Footer Placeholder 5">
+            <a:extLst>
+              <a:ext uri="{FF2B5EF4-FFF2-40B4-BE49-F238E27FC236}">
+                <a16:creationId xmlns:a16="http://schemas.microsoft.com/office/drawing/2014/main" id="{4C7C421F-4AEC-D264-5EDC-EA44C367E468}"/>
+              </a:ext>
+            </a:extLst>
+          </p:cNvPr>
+          <p:cNvSpPr>
+            <a:spLocks noGrp="1"/>
+          </p:cNvSpPr>
+          <p:nvPr>
+            <p:ph type="ftr" sz="quarter" idx="11"/>
+          </p:nvPr>
+        </p:nvSpPr>
+        <p:spPr>
+          <a:xfrm>
+            <a:off x="8077200" y="6321626"/>
+            <a:ext cx="4114800" cy="365125"/>
+          </a:xfrm>
+        </p:spPr>
+        <p:txBody>
+          <a:bodyPr/>
+          <a:lstStyle/>
+          <a:p>
+            <a:r>
+              <a:rPr lang="en-US" sz="1600" dirty="0">
+                <a:solidFill>
+                  <a:srgbClr val="FF0000"/>
+                </a:solidFill>
+              </a:rPr>
+              <a:t>R</a:t>
+            </a:r>
+            <a:r>
+              <a:rPr lang="en-US" dirty="0">
+                <a:solidFill>
+                  <a:srgbClr val="00B050"/>
+                </a:solidFill>
+              </a:rPr>
+              <a:t>hash</a:t>
+            </a:r>
+            <a:r>
+              <a:rPr lang="en-US" dirty="0"/>
+              <a:t> </a:t>
+            </a:r>
+            <a:r>
+              <a:rPr lang="en-US" dirty="0">
+                <a:solidFill>
+                  <a:srgbClr val="0432FF"/>
+                </a:solidFill>
+              </a:rPr>
+              <a:t>Algo</a:t>
+            </a:r>
+          </a:p>
+        </p:txBody>
+      </p:sp>
     </p:spTree>
     <p:extLst>
       <p:ext uri="{BB962C8B-B14F-4D97-AF65-F5344CB8AC3E}">
         <p14:creationId xmlns:p14="http://schemas.microsoft.com/office/powerpoint/2010/main" val="3454509949"/>
+      </p:ext>
+    </p:extLst>
+  </p:cSld>
+  <p:clrMapOvr>
+    <a:masterClrMapping/>
+  </p:clrMapOvr>
+</p:sld>
+</file>
+
+<file path=ppt/slides/slide2.xml><?xml version="1.0" encoding="utf-8"?>
+<p:sld xmlns:a="http://schemas.openxmlformats.org/drawingml/2006/main" xmlns:r="http://schemas.openxmlformats.org/officeDocument/2006/relationships" xmlns:p="http://schemas.openxmlformats.org/presentationml/2006/main">
+  <p:cSld>
+    <p:spTree>
+      <p:nvGrpSpPr>
+        <p:cNvPr id="1" name=""/>
+        <p:cNvGrpSpPr/>
+        <p:nvPr/>
+      </p:nvGrpSpPr>
+      <p:grpSpPr>
+        <a:xfrm>
+          <a:off x="0" y="0"/>
+          <a:ext cx="0" cy="0"/>
+          <a:chOff x="0" y="0"/>
+          <a:chExt cx="0" cy="0"/>
+        </a:xfrm>
+      </p:grpSpPr>
+      <p:sp>
+        <p:nvSpPr>
+          <p:cNvPr id="2" name="Title 1">
+            <a:extLst>
+              <a:ext uri="{FF2B5EF4-FFF2-40B4-BE49-F238E27FC236}">
+                <a16:creationId xmlns:a16="http://schemas.microsoft.com/office/drawing/2014/main" id="{A2278CCA-07BC-E317-D9BD-DB76191B0394}"/>
+              </a:ext>
+            </a:extLst>
+          </p:cNvPr>
+          <p:cNvSpPr>
+            <a:spLocks noGrp="1"/>
+          </p:cNvSpPr>
+          <p:nvPr>
+            <p:ph type="title"/>
+          </p:nvPr>
+        </p:nvSpPr>
+        <p:spPr>
+          <a:xfrm>
+            <a:off x="838200" y="365125"/>
+            <a:ext cx="10515600" cy="984173"/>
+          </a:xfrm>
+        </p:spPr>
+        <p:txBody>
+          <a:bodyPr/>
+          <a:lstStyle/>
+          <a:p>
+            <a:r>
+              <a:rPr lang="en-US" dirty="0"/>
+              <a:t>What’s covered?</a:t>
+            </a:r>
+          </a:p>
+        </p:txBody>
+      </p:sp>
+      <p:sp>
+        <p:nvSpPr>
+          <p:cNvPr id="3" name="Content Placeholder 2">
+            <a:extLst>
+              <a:ext uri="{FF2B5EF4-FFF2-40B4-BE49-F238E27FC236}">
+                <a16:creationId xmlns:a16="http://schemas.microsoft.com/office/drawing/2014/main" id="{A29EA919-2613-FDA1-9B6C-E40C06617313}"/>
+              </a:ext>
+            </a:extLst>
+          </p:cNvPr>
+          <p:cNvSpPr>
+            <a:spLocks noGrp="1"/>
+          </p:cNvSpPr>
+          <p:nvPr>
+            <p:ph idx="1"/>
+          </p:nvPr>
+        </p:nvSpPr>
+        <p:spPr/>
+        <p:txBody>
+          <a:bodyPr/>
+          <a:lstStyle/>
+          <a:p>
+            <a:r>
+              <a:rPr lang="en-IN" dirty="0">
+                <a:effectLst/>
+                <a:latin typeface="Helvetica" pitchFamily="2" charset="0"/>
+              </a:rPr>
+              <a:t>What can Python do?</a:t>
+            </a:r>
+          </a:p>
+          <a:p>
+            <a:r>
+              <a:rPr lang="en-IN" dirty="0">
+                <a:effectLst/>
+                <a:latin typeface="Helvetica" pitchFamily="2" charset="0"/>
+              </a:rPr>
+              <a:t>Why Python?</a:t>
+            </a:r>
+          </a:p>
+          <a:p>
+            <a:r>
+              <a:rPr lang="en-IN" dirty="0">
+                <a:effectLst/>
+                <a:latin typeface="Helvetica" pitchFamily="2" charset="0"/>
+              </a:rPr>
+              <a:t>Good to know</a:t>
+            </a:r>
+          </a:p>
+          <a:p>
+            <a:r>
+              <a:rPr lang="en-IN" dirty="0">
+                <a:effectLst/>
+                <a:latin typeface="Helvetica" pitchFamily="2" charset="0"/>
+              </a:rPr>
+              <a:t>Python </a:t>
+            </a:r>
+            <a:r>
+              <a:rPr lang="en-IN">
+                <a:effectLst/>
+                <a:latin typeface="Helvetica" pitchFamily="2" charset="0"/>
+              </a:rPr>
+              <a:t>Syntax </a:t>
+            </a:r>
+          </a:p>
+          <a:p>
+            <a:r>
+              <a:rPr lang="en-IN">
+                <a:effectLst/>
+                <a:latin typeface="Helvetica" pitchFamily="2" charset="0"/>
+              </a:rPr>
+              <a:t>Python </a:t>
+            </a:r>
+            <a:r>
+              <a:rPr lang="en-IN" dirty="0">
+                <a:effectLst/>
+                <a:latin typeface="Helvetica" pitchFamily="2" charset="0"/>
+              </a:rPr>
+              <a:t>Install</a:t>
+            </a:r>
+          </a:p>
+          <a:p>
+            <a:pPr marL="0" indent="0">
+              <a:buNone/>
+            </a:pPr>
+            <a:endParaRPr lang="en-US" dirty="0"/>
+          </a:p>
+        </p:txBody>
+      </p:sp>
+      <p:sp>
+        <p:nvSpPr>
+          <p:cNvPr id="5" name="Footer Placeholder 5">
+            <a:extLst>
+              <a:ext uri="{FF2B5EF4-FFF2-40B4-BE49-F238E27FC236}">
+                <a16:creationId xmlns:a16="http://schemas.microsoft.com/office/drawing/2014/main" id="{746413F3-577B-0516-5EE5-2C8454973406}"/>
+              </a:ext>
+            </a:extLst>
+          </p:cNvPr>
+          <p:cNvSpPr>
+            <a:spLocks noGrp="1"/>
+          </p:cNvSpPr>
+          <p:nvPr>
+            <p:ph type="ftr" sz="quarter" idx="11"/>
+          </p:nvPr>
+        </p:nvSpPr>
+        <p:spPr>
+          <a:xfrm>
+            <a:off x="8077200" y="6321626"/>
+            <a:ext cx="4114800" cy="365125"/>
+          </a:xfrm>
+        </p:spPr>
+        <p:txBody>
+          <a:bodyPr/>
+          <a:lstStyle/>
+          <a:p>
+            <a:r>
+              <a:rPr lang="en-US" sz="1600" dirty="0">
+                <a:solidFill>
+                  <a:srgbClr val="FF0000"/>
+                </a:solidFill>
+              </a:rPr>
+              <a:t>R</a:t>
+            </a:r>
+            <a:r>
+              <a:rPr lang="en-US" dirty="0">
+                <a:solidFill>
+                  <a:srgbClr val="00B050"/>
+                </a:solidFill>
+              </a:rPr>
+              <a:t>hash</a:t>
+            </a:r>
+            <a:r>
+              <a:rPr lang="en-US" dirty="0"/>
+              <a:t> </a:t>
+            </a:r>
+            <a:r>
+              <a:rPr lang="en-US" dirty="0">
+                <a:solidFill>
+                  <a:srgbClr val="0432FF"/>
+                </a:solidFill>
+              </a:rPr>
+              <a:t>Algo</a:t>
+            </a:r>
+          </a:p>
+        </p:txBody>
+      </p:sp>
+    </p:spTree>
+    <p:extLst>
+      <p:ext uri="{BB962C8B-B14F-4D97-AF65-F5344CB8AC3E}">
+        <p14:creationId xmlns:p14="http://schemas.microsoft.com/office/powerpoint/2010/main" val="3011364138"/>
+      </p:ext>
+    </p:extLst>
+  </p:cSld>
+  <p:clrMapOvr>
+    <a:masterClrMapping/>
+  </p:clrMapOvr>
+</p:sld>
+</file>
+
+<file path=ppt/slides/slide3.xml><?xml version="1.0" encoding="utf-8"?>
+<p:sld xmlns:a="http://schemas.openxmlformats.org/drawingml/2006/main" xmlns:r="http://schemas.openxmlformats.org/officeDocument/2006/relationships" xmlns:p="http://schemas.openxmlformats.org/presentationml/2006/main">
+  <p:cSld>
+    <p:spTree>
+      <p:nvGrpSpPr>
+        <p:cNvPr id="1" name=""/>
+        <p:cNvGrpSpPr/>
+        <p:nvPr/>
+      </p:nvGrpSpPr>
+      <p:grpSpPr>
+        <a:xfrm>
+          <a:off x="0" y="0"/>
+          <a:ext cx="0" cy="0"/>
+          <a:chOff x="0" y="0"/>
+          <a:chExt cx="0" cy="0"/>
+        </a:xfrm>
+      </p:grpSpPr>
+      <p:sp>
+        <p:nvSpPr>
+          <p:cNvPr id="2" name="Title 1">
+            <a:extLst>
+              <a:ext uri="{FF2B5EF4-FFF2-40B4-BE49-F238E27FC236}">
+                <a16:creationId xmlns:a16="http://schemas.microsoft.com/office/drawing/2014/main" id="{67AD141D-E5B9-2A87-A872-DC5D112F982F}"/>
+              </a:ext>
+            </a:extLst>
+          </p:cNvPr>
+          <p:cNvSpPr>
+            <a:spLocks noGrp="1"/>
+          </p:cNvSpPr>
+          <p:nvPr>
+            <p:ph type="title"/>
+          </p:nvPr>
+        </p:nvSpPr>
+        <p:spPr/>
+        <p:txBody>
+          <a:bodyPr/>
+          <a:lstStyle/>
+          <a:p>
+            <a:r>
+              <a:rPr lang="en-IN" dirty="0">
+                <a:effectLst/>
+                <a:latin typeface="Helvetica" pitchFamily="2" charset="0"/>
+              </a:rPr>
+              <a:t>What can Python do?</a:t>
+            </a:r>
+            <a:endParaRPr lang="en-US" b="1" dirty="0"/>
+          </a:p>
+        </p:txBody>
+      </p:sp>
+      <p:sp>
+        <p:nvSpPr>
+          <p:cNvPr id="3" name="Content Placeholder 2">
+            <a:extLst>
+              <a:ext uri="{FF2B5EF4-FFF2-40B4-BE49-F238E27FC236}">
+                <a16:creationId xmlns:a16="http://schemas.microsoft.com/office/drawing/2014/main" id="{AA35F5E0-01AD-BB3D-BF88-5E77C6E1FB9C}"/>
+              </a:ext>
+            </a:extLst>
+          </p:cNvPr>
+          <p:cNvSpPr>
+            <a:spLocks noGrp="1"/>
+          </p:cNvSpPr>
+          <p:nvPr>
+            <p:ph idx="1"/>
+          </p:nvPr>
+        </p:nvSpPr>
+        <p:spPr/>
+        <p:txBody>
+          <a:bodyPr/>
+          <a:lstStyle/>
+          <a:p>
+            <a:r>
+              <a:rPr lang="en-IN" b="1" dirty="0">
+                <a:solidFill>
+                  <a:srgbClr val="202124"/>
+                </a:solidFill>
+                <a:latin typeface="arial" panose="020B0604020202020204" pitchFamily="34" charset="0"/>
+              </a:rPr>
+              <a:t>B</a:t>
+            </a:r>
+            <a:r>
+              <a:rPr lang="en-IN" b="1" i="0" dirty="0">
+                <a:solidFill>
+                  <a:srgbClr val="202124"/>
+                </a:solidFill>
+                <a:effectLst/>
+                <a:latin typeface="arial" panose="020B0604020202020204" pitchFamily="34" charset="0"/>
+              </a:rPr>
+              <a:t>uild websites and software</a:t>
+            </a:r>
+          </a:p>
+          <a:p>
+            <a:r>
+              <a:rPr lang="en-IN" b="1" dirty="0">
+                <a:solidFill>
+                  <a:srgbClr val="202124"/>
+                </a:solidFill>
+                <a:latin typeface="arial" panose="020B0604020202020204" pitchFamily="34" charset="0"/>
+              </a:rPr>
+              <a:t>Automate routine tasks</a:t>
+            </a:r>
+            <a:endParaRPr lang="en-US" b="1" dirty="0">
+              <a:solidFill>
+                <a:srgbClr val="202124"/>
+              </a:solidFill>
+              <a:latin typeface="arial" panose="020B0604020202020204" pitchFamily="34" charset="0"/>
+            </a:endParaRPr>
+          </a:p>
+          <a:p>
+            <a:r>
+              <a:rPr lang="en-US" b="1" dirty="0">
+                <a:solidFill>
+                  <a:srgbClr val="202124"/>
+                </a:solidFill>
+                <a:latin typeface="arial" panose="020B0604020202020204" pitchFamily="34" charset="0"/>
+              </a:rPr>
+              <a:t>Data Analysis</a:t>
+            </a:r>
+          </a:p>
+          <a:p>
+            <a:r>
+              <a:rPr lang="en-US" b="1" dirty="0">
+                <a:solidFill>
+                  <a:srgbClr val="202124"/>
+                </a:solidFill>
+                <a:latin typeface="arial" panose="020B0604020202020204" pitchFamily="34" charset="0"/>
+              </a:rPr>
+              <a:t>Game Development</a:t>
+            </a:r>
+          </a:p>
+          <a:p>
+            <a:endParaRPr lang="en-IN" b="1" dirty="0">
+              <a:solidFill>
+                <a:srgbClr val="202124"/>
+              </a:solidFill>
+              <a:latin typeface="arial" panose="020B0604020202020204" pitchFamily="34" charset="0"/>
+            </a:endParaRPr>
+          </a:p>
+        </p:txBody>
+      </p:sp>
+      <p:sp>
+        <p:nvSpPr>
+          <p:cNvPr id="5" name="Footer Placeholder 5">
+            <a:extLst>
+              <a:ext uri="{FF2B5EF4-FFF2-40B4-BE49-F238E27FC236}">
+                <a16:creationId xmlns:a16="http://schemas.microsoft.com/office/drawing/2014/main" id="{4CCE947F-E190-5719-6B92-CBE177777ED5}"/>
+              </a:ext>
+            </a:extLst>
+          </p:cNvPr>
+          <p:cNvSpPr>
+            <a:spLocks noGrp="1"/>
+          </p:cNvSpPr>
+          <p:nvPr>
+            <p:ph type="ftr" sz="quarter" idx="11"/>
+          </p:nvPr>
+        </p:nvSpPr>
+        <p:spPr>
+          <a:xfrm>
+            <a:off x="8077200" y="6321626"/>
+            <a:ext cx="4114800" cy="365125"/>
+          </a:xfrm>
+        </p:spPr>
+        <p:txBody>
+          <a:bodyPr/>
+          <a:lstStyle/>
+          <a:p>
+            <a:r>
+              <a:rPr lang="en-US" sz="1600" dirty="0">
+                <a:solidFill>
+                  <a:srgbClr val="FF0000"/>
+                </a:solidFill>
+              </a:rPr>
+              <a:t>R</a:t>
+            </a:r>
+            <a:r>
+              <a:rPr lang="en-US" dirty="0">
+                <a:solidFill>
+                  <a:srgbClr val="00B050"/>
+                </a:solidFill>
+              </a:rPr>
+              <a:t>hash</a:t>
+            </a:r>
+            <a:r>
+              <a:rPr lang="en-US" dirty="0"/>
+              <a:t> </a:t>
+            </a:r>
+            <a:r>
+              <a:rPr lang="en-US" dirty="0">
+                <a:solidFill>
+                  <a:srgbClr val="0432FF"/>
+                </a:solidFill>
+              </a:rPr>
+              <a:t>Algo</a:t>
+            </a:r>
+          </a:p>
+        </p:txBody>
+      </p:sp>
+    </p:spTree>
+    <p:extLst>
+      <p:ext uri="{BB962C8B-B14F-4D97-AF65-F5344CB8AC3E}">
+        <p14:creationId xmlns:p14="http://schemas.microsoft.com/office/powerpoint/2010/main" val="3284343904"/>
+      </p:ext>
+    </p:extLst>
+  </p:cSld>
+  <p:clrMapOvr>
+    <a:masterClrMapping/>
+  </p:clrMapOvr>
+</p:sld>
+</file>
+
+<file path=ppt/slides/slide4.xml><?xml version="1.0" encoding="utf-8"?>
+<p:sld xmlns:a="http://schemas.openxmlformats.org/drawingml/2006/main" xmlns:r="http://schemas.openxmlformats.org/officeDocument/2006/relationships" xmlns:p="http://schemas.openxmlformats.org/presentationml/2006/main">
+  <p:cSld>
+    <p:spTree>
+      <p:nvGrpSpPr>
+        <p:cNvPr id="1" name=""/>
+        <p:cNvGrpSpPr/>
+        <p:nvPr/>
+      </p:nvGrpSpPr>
+      <p:grpSpPr>
+        <a:xfrm>
+          <a:off x="0" y="0"/>
+          <a:ext cx="0" cy="0"/>
+          <a:chOff x="0" y="0"/>
+          <a:chExt cx="0" cy="0"/>
+        </a:xfrm>
+      </p:grpSpPr>
+      <p:sp>
+        <p:nvSpPr>
+          <p:cNvPr id="2" name="Title 1">
+            <a:extLst>
+              <a:ext uri="{FF2B5EF4-FFF2-40B4-BE49-F238E27FC236}">
+                <a16:creationId xmlns:a16="http://schemas.microsoft.com/office/drawing/2014/main" id="{FD286E33-6B5B-0242-B408-294AFCD10C9C}"/>
+              </a:ext>
+            </a:extLst>
+          </p:cNvPr>
+          <p:cNvSpPr>
+            <a:spLocks noGrp="1"/>
+          </p:cNvSpPr>
+          <p:nvPr>
+            <p:ph type="title"/>
+          </p:nvPr>
+        </p:nvSpPr>
+        <p:spPr/>
+        <p:txBody>
+          <a:bodyPr/>
+          <a:lstStyle/>
+          <a:p>
+            <a:r>
+              <a:rPr lang="en-IN" dirty="0">
+                <a:effectLst/>
+                <a:latin typeface="Helvetica" pitchFamily="2" charset="0"/>
+              </a:rPr>
+              <a:t>Why &amp; Where Python?</a:t>
+            </a:r>
+            <a:endParaRPr lang="en-US" dirty="0"/>
+          </a:p>
+        </p:txBody>
+      </p:sp>
+      <p:sp>
+        <p:nvSpPr>
+          <p:cNvPr id="3" name="Content Placeholder 2">
+            <a:extLst>
+              <a:ext uri="{FF2B5EF4-FFF2-40B4-BE49-F238E27FC236}">
+                <a16:creationId xmlns:a16="http://schemas.microsoft.com/office/drawing/2014/main" id="{FAB12794-21A0-EA28-DFA4-6A294C2AB13F}"/>
+              </a:ext>
+            </a:extLst>
+          </p:cNvPr>
+          <p:cNvSpPr>
+            <a:spLocks noGrp="1"/>
+          </p:cNvSpPr>
+          <p:nvPr>
+            <p:ph idx="1"/>
+          </p:nvPr>
+        </p:nvSpPr>
+        <p:spPr/>
+        <p:txBody>
+          <a:bodyPr>
+            <a:normAutofit lnSpcReduction="10000"/>
+          </a:bodyPr>
+          <a:lstStyle/>
+          <a:p>
+            <a:r>
+              <a:rPr lang="en-US" dirty="0"/>
+              <a:t>General Purpose Language</a:t>
+            </a:r>
+          </a:p>
+          <a:p>
+            <a:r>
+              <a:rPr lang="en-US" dirty="0"/>
+              <a:t>General &amp; App Specific Testing</a:t>
+            </a:r>
+          </a:p>
+          <a:p>
+            <a:r>
+              <a:rPr lang="en-US" dirty="0"/>
+              <a:t>Finance &amp; Trading</a:t>
+            </a:r>
+          </a:p>
+          <a:p>
+            <a:r>
+              <a:rPr lang="en-US" dirty="0"/>
+              <a:t>Automation &amp; Administration</a:t>
+            </a:r>
+          </a:p>
+          <a:p>
+            <a:r>
+              <a:rPr lang="en-US" dirty="0"/>
+              <a:t>Data Science</a:t>
+            </a:r>
+          </a:p>
+          <a:p>
+            <a:r>
+              <a:rPr lang="en-US" dirty="0"/>
+              <a:t>Data Analysis</a:t>
+            </a:r>
+          </a:p>
+          <a:p>
+            <a:r>
+              <a:rPr lang="en-US" dirty="0"/>
+              <a:t>Scientific and mathematical computing</a:t>
+            </a:r>
+          </a:p>
+          <a:p>
+            <a:r>
+              <a:rPr lang="en-US" dirty="0"/>
+              <a:t>Computer Graphics</a:t>
+            </a:r>
+          </a:p>
+          <a:p>
+            <a:r>
+              <a:rPr lang="en-US" dirty="0"/>
+              <a:t>Etc.</a:t>
+            </a:r>
+          </a:p>
+          <a:p>
+            <a:endParaRPr lang="en-US" dirty="0"/>
+          </a:p>
+        </p:txBody>
+      </p:sp>
+      <p:sp>
+        <p:nvSpPr>
+          <p:cNvPr id="5" name="Footer Placeholder 5">
+            <a:extLst>
+              <a:ext uri="{FF2B5EF4-FFF2-40B4-BE49-F238E27FC236}">
+                <a16:creationId xmlns:a16="http://schemas.microsoft.com/office/drawing/2014/main" id="{5DA94476-7BF6-45DC-7992-6C24A5764FEB}"/>
+              </a:ext>
+            </a:extLst>
+          </p:cNvPr>
+          <p:cNvSpPr>
+            <a:spLocks noGrp="1"/>
+          </p:cNvSpPr>
+          <p:nvPr>
+            <p:ph type="ftr" sz="quarter" idx="11"/>
+          </p:nvPr>
+        </p:nvSpPr>
+        <p:spPr>
+          <a:xfrm>
+            <a:off x="8077200" y="6321626"/>
+            <a:ext cx="4114800" cy="365125"/>
+          </a:xfrm>
+        </p:spPr>
+        <p:txBody>
+          <a:bodyPr/>
+          <a:lstStyle/>
+          <a:p>
+            <a:r>
+              <a:rPr lang="en-US" sz="1600" dirty="0">
+                <a:solidFill>
+                  <a:srgbClr val="FF0000"/>
+                </a:solidFill>
+              </a:rPr>
+              <a:t>R</a:t>
+            </a:r>
+            <a:r>
+              <a:rPr lang="en-US" dirty="0">
+                <a:solidFill>
+                  <a:srgbClr val="00B050"/>
+                </a:solidFill>
+              </a:rPr>
+              <a:t>hash</a:t>
+            </a:r>
+            <a:r>
+              <a:rPr lang="en-US" dirty="0"/>
+              <a:t> </a:t>
+            </a:r>
+            <a:r>
+              <a:rPr lang="en-US" dirty="0">
+                <a:solidFill>
+                  <a:srgbClr val="0432FF"/>
+                </a:solidFill>
+              </a:rPr>
+              <a:t>Algo</a:t>
+            </a:r>
+          </a:p>
+        </p:txBody>
+      </p:sp>
+    </p:spTree>
+    <p:extLst>
+      <p:ext uri="{BB962C8B-B14F-4D97-AF65-F5344CB8AC3E}">
+        <p14:creationId xmlns:p14="http://schemas.microsoft.com/office/powerpoint/2010/main" val="4007012738"/>
+      </p:ext>
+    </p:extLst>
+  </p:cSld>
+  <p:clrMapOvr>
+    <a:masterClrMapping/>
+  </p:clrMapOvr>
+</p:sld>
+</file>
+
+<file path=ppt/slides/slide5.xml><?xml version="1.0" encoding="utf-8"?>
+<p:sld xmlns:a="http://schemas.openxmlformats.org/drawingml/2006/main" xmlns:r="http://schemas.openxmlformats.org/officeDocument/2006/relationships" xmlns:p="http://schemas.openxmlformats.org/presentationml/2006/main">
+  <p:cSld>
+    <p:spTree>
+      <p:nvGrpSpPr>
+        <p:cNvPr id="1" name=""/>
+        <p:cNvGrpSpPr/>
+        <p:nvPr/>
+      </p:nvGrpSpPr>
+      <p:grpSpPr>
+        <a:xfrm>
+          <a:off x="0" y="0"/>
+          <a:ext cx="0" cy="0"/>
+          <a:chOff x="0" y="0"/>
+          <a:chExt cx="0" cy="0"/>
+        </a:xfrm>
+      </p:grpSpPr>
+      <p:sp>
+        <p:nvSpPr>
+          <p:cNvPr id="2" name="Title 1">
+            <a:extLst>
+              <a:ext uri="{FF2B5EF4-FFF2-40B4-BE49-F238E27FC236}">
+                <a16:creationId xmlns:a16="http://schemas.microsoft.com/office/drawing/2014/main" id="{2C286196-CA26-7400-2FC7-81556BCF4C88}"/>
+              </a:ext>
+            </a:extLst>
+          </p:cNvPr>
+          <p:cNvSpPr>
+            <a:spLocks noGrp="1"/>
+          </p:cNvSpPr>
+          <p:nvPr>
+            <p:ph type="title"/>
+          </p:nvPr>
+        </p:nvSpPr>
+        <p:spPr/>
+        <p:txBody>
+          <a:bodyPr/>
+          <a:lstStyle/>
+          <a:p>
+            <a:r>
+              <a:rPr lang="en-IN" dirty="0">
+                <a:effectLst/>
+                <a:latin typeface="Helvetica" pitchFamily="2" charset="0"/>
+              </a:rPr>
+              <a:t>Good to know</a:t>
+            </a:r>
+            <a:endParaRPr lang="en-US" dirty="0"/>
+          </a:p>
+        </p:txBody>
+      </p:sp>
+      <p:sp>
+        <p:nvSpPr>
+          <p:cNvPr id="3" name="Content Placeholder 2">
+            <a:extLst>
+              <a:ext uri="{FF2B5EF4-FFF2-40B4-BE49-F238E27FC236}">
+                <a16:creationId xmlns:a16="http://schemas.microsoft.com/office/drawing/2014/main" id="{E2994228-B67F-72CE-0078-FCE200EE3DB3}"/>
+              </a:ext>
+            </a:extLst>
+          </p:cNvPr>
+          <p:cNvSpPr>
+            <a:spLocks noGrp="1"/>
+          </p:cNvSpPr>
+          <p:nvPr>
+            <p:ph idx="1"/>
+          </p:nvPr>
+        </p:nvSpPr>
+        <p:spPr/>
+        <p:txBody>
+          <a:bodyPr/>
+          <a:lstStyle/>
+          <a:p>
+            <a:r>
+              <a:rPr lang="en-US" dirty="0"/>
+              <a:t>Basics of Programming</a:t>
+            </a:r>
+          </a:p>
+          <a:p>
+            <a:endParaRPr lang="en-US" dirty="0"/>
+          </a:p>
+        </p:txBody>
+      </p:sp>
+      <p:sp>
+        <p:nvSpPr>
+          <p:cNvPr id="5" name="Footer Placeholder 5">
+            <a:extLst>
+              <a:ext uri="{FF2B5EF4-FFF2-40B4-BE49-F238E27FC236}">
+                <a16:creationId xmlns:a16="http://schemas.microsoft.com/office/drawing/2014/main" id="{E5366108-4CFD-588A-E0D7-F4F18DEFD0B7}"/>
+              </a:ext>
+            </a:extLst>
+          </p:cNvPr>
+          <p:cNvSpPr>
+            <a:spLocks noGrp="1"/>
+          </p:cNvSpPr>
+          <p:nvPr>
+            <p:ph type="ftr" sz="quarter" idx="11"/>
+          </p:nvPr>
+        </p:nvSpPr>
+        <p:spPr>
+          <a:xfrm>
+            <a:off x="8077200" y="6321626"/>
+            <a:ext cx="4114800" cy="365125"/>
+          </a:xfrm>
+        </p:spPr>
+        <p:txBody>
+          <a:bodyPr/>
+          <a:lstStyle/>
+          <a:p>
+            <a:r>
+              <a:rPr lang="en-US" sz="1600" dirty="0">
+                <a:solidFill>
+                  <a:srgbClr val="FF0000"/>
+                </a:solidFill>
+              </a:rPr>
+              <a:t>R</a:t>
+            </a:r>
+            <a:r>
+              <a:rPr lang="en-US" dirty="0">
+                <a:solidFill>
+                  <a:srgbClr val="00B050"/>
+                </a:solidFill>
+              </a:rPr>
+              <a:t>hash</a:t>
+            </a:r>
+            <a:r>
+              <a:rPr lang="en-US" dirty="0"/>
+              <a:t> </a:t>
+            </a:r>
+            <a:r>
+              <a:rPr lang="en-US" dirty="0">
+                <a:solidFill>
+                  <a:srgbClr val="0432FF"/>
+                </a:solidFill>
+              </a:rPr>
+              <a:t>Algo</a:t>
+            </a:r>
+          </a:p>
+        </p:txBody>
+      </p:sp>
+    </p:spTree>
+    <p:extLst>
+      <p:ext uri="{BB962C8B-B14F-4D97-AF65-F5344CB8AC3E}">
+        <p14:creationId xmlns:p14="http://schemas.microsoft.com/office/powerpoint/2010/main" val="4230597031"/>
+      </p:ext>
+    </p:extLst>
+  </p:cSld>
+  <p:clrMapOvr>
+    <a:masterClrMapping/>
+  </p:clrMapOvr>
+</p:sld>
+</file>
+
+<file path=ppt/slides/slide6.xml><?xml version="1.0" encoding="utf-8"?>
+<p:sld xmlns:a="http://schemas.openxmlformats.org/drawingml/2006/main" xmlns:r="http://schemas.openxmlformats.org/officeDocument/2006/relationships" xmlns:p="http://schemas.openxmlformats.org/presentationml/2006/main">
+  <p:cSld>
+    <p:spTree>
+      <p:nvGrpSpPr>
+        <p:cNvPr id="1" name=""/>
+        <p:cNvGrpSpPr/>
+        <p:nvPr/>
+      </p:nvGrpSpPr>
+      <p:grpSpPr>
+        <a:xfrm>
+          <a:off x="0" y="0"/>
+          <a:ext cx="0" cy="0"/>
+          <a:chOff x="0" y="0"/>
+          <a:chExt cx="0" cy="0"/>
+        </a:xfrm>
+      </p:grpSpPr>
+      <p:sp>
+        <p:nvSpPr>
+          <p:cNvPr id="2" name="Title 1">
+            <a:extLst>
+              <a:ext uri="{FF2B5EF4-FFF2-40B4-BE49-F238E27FC236}">
+                <a16:creationId xmlns:a16="http://schemas.microsoft.com/office/drawing/2014/main" id="{C66BEE0E-BFAA-05FE-E3B7-86F2DC9E4280}"/>
+              </a:ext>
+            </a:extLst>
+          </p:cNvPr>
+          <p:cNvSpPr>
+            <a:spLocks noGrp="1"/>
+          </p:cNvSpPr>
+          <p:nvPr>
+            <p:ph type="title"/>
+          </p:nvPr>
+        </p:nvSpPr>
+        <p:spPr/>
+        <p:txBody>
+          <a:bodyPr>
+            <a:normAutofit/>
+          </a:bodyPr>
+          <a:lstStyle/>
+          <a:p>
+            <a:r>
+              <a:rPr lang="en-IN" dirty="0">
+                <a:effectLst/>
+                <a:latin typeface="Helvetica" pitchFamily="2" charset="0"/>
+              </a:rPr>
+              <a:t>Python Syntax</a:t>
+            </a:r>
+            <a:endParaRPr lang="en-US" dirty="0"/>
+          </a:p>
+        </p:txBody>
+      </p:sp>
+      <p:sp>
+        <p:nvSpPr>
+          <p:cNvPr id="3" name="Content Placeholder 2">
+            <a:extLst>
+              <a:ext uri="{FF2B5EF4-FFF2-40B4-BE49-F238E27FC236}">
+                <a16:creationId xmlns:a16="http://schemas.microsoft.com/office/drawing/2014/main" id="{D89DA03D-C752-D72E-DC1F-192395EEF6CB}"/>
+              </a:ext>
+            </a:extLst>
+          </p:cNvPr>
+          <p:cNvSpPr>
+            <a:spLocks noGrp="1"/>
+          </p:cNvSpPr>
+          <p:nvPr>
+            <p:ph idx="1"/>
+          </p:nvPr>
+        </p:nvSpPr>
+        <p:spPr/>
+        <p:txBody>
+          <a:bodyPr/>
+          <a:lstStyle/>
+          <a:p>
+            <a:r>
+              <a:rPr lang="en-IN" b="1" i="0" dirty="0">
+                <a:solidFill>
+                  <a:srgbClr val="202124"/>
+                </a:solidFill>
+                <a:effectLst/>
+                <a:latin typeface="arial" panose="020B0604020202020204" pitchFamily="34" charset="0"/>
+              </a:rPr>
+              <a:t>Interpreted</a:t>
+            </a:r>
+            <a:r>
+              <a:rPr lang="en-US" b="1" i="0" dirty="0">
+                <a:solidFill>
+                  <a:srgbClr val="202124"/>
+                </a:solidFill>
+                <a:effectLst/>
+                <a:latin typeface="arial" panose="020B0604020202020204" pitchFamily="34" charset="0"/>
+              </a:rPr>
+              <a:t> &amp; </a:t>
+            </a:r>
+            <a:r>
+              <a:rPr lang="en-IN" b="1" i="0" dirty="0">
+                <a:solidFill>
+                  <a:srgbClr val="202124"/>
+                </a:solidFill>
+                <a:effectLst/>
+                <a:latin typeface="arial" panose="020B0604020202020204" pitchFamily="34" charset="0"/>
+              </a:rPr>
+              <a:t>dynamically typed language</a:t>
+            </a:r>
+          </a:p>
+          <a:p>
+            <a:endParaRPr lang="en-IN" b="1" dirty="0">
+              <a:solidFill>
+                <a:srgbClr val="202124"/>
+              </a:solidFill>
+              <a:latin typeface="arial" panose="020B0604020202020204" pitchFamily="34" charset="0"/>
+            </a:endParaRPr>
+          </a:p>
+          <a:p>
+            <a:endParaRPr lang="en-IN" b="1" dirty="0">
+              <a:solidFill>
+                <a:srgbClr val="202124"/>
+              </a:solidFill>
+              <a:latin typeface="arial" panose="020B0604020202020204" pitchFamily="34" charset="0"/>
+            </a:endParaRPr>
+          </a:p>
+          <a:p>
+            <a:r>
+              <a:rPr lang="en-US" dirty="0"/>
+              <a:t>https://</a:t>
+            </a:r>
+            <a:r>
+              <a:rPr lang="en-US" dirty="0" err="1"/>
+              <a:t>www.python.org</a:t>
+            </a:r>
+            <a:r>
+              <a:rPr lang="en-US" dirty="0"/>
+              <a:t>/doc/essays/comparisons/</a:t>
+            </a:r>
+          </a:p>
+        </p:txBody>
+      </p:sp>
+      <p:sp>
+        <p:nvSpPr>
+          <p:cNvPr id="5" name="Footer Placeholder 5">
+            <a:extLst>
+              <a:ext uri="{FF2B5EF4-FFF2-40B4-BE49-F238E27FC236}">
+                <a16:creationId xmlns:a16="http://schemas.microsoft.com/office/drawing/2014/main" id="{594DFB44-7913-5D89-210D-26FD3521786E}"/>
+              </a:ext>
+            </a:extLst>
+          </p:cNvPr>
+          <p:cNvSpPr>
+            <a:spLocks noGrp="1"/>
+          </p:cNvSpPr>
+          <p:nvPr>
+            <p:ph type="ftr" sz="quarter" idx="11"/>
+          </p:nvPr>
+        </p:nvSpPr>
+        <p:spPr>
+          <a:xfrm>
+            <a:off x="8077200" y="6321626"/>
+            <a:ext cx="4114800" cy="365125"/>
+          </a:xfrm>
+        </p:spPr>
+        <p:txBody>
+          <a:bodyPr/>
+          <a:lstStyle/>
+          <a:p>
+            <a:r>
+              <a:rPr lang="en-US" sz="1600" dirty="0">
+                <a:solidFill>
+                  <a:srgbClr val="FF0000"/>
+                </a:solidFill>
+              </a:rPr>
+              <a:t>R</a:t>
+            </a:r>
+            <a:r>
+              <a:rPr lang="en-US" dirty="0">
+                <a:solidFill>
+                  <a:srgbClr val="00B050"/>
+                </a:solidFill>
+              </a:rPr>
+              <a:t>hash</a:t>
+            </a:r>
+            <a:r>
+              <a:rPr lang="en-US" dirty="0"/>
+              <a:t> </a:t>
+            </a:r>
+            <a:r>
+              <a:rPr lang="en-US" dirty="0">
+                <a:solidFill>
+                  <a:srgbClr val="0432FF"/>
+                </a:solidFill>
+              </a:rPr>
+              <a:t>Algo</a:t>
+            </a:r>
+          </a:p>
+        </p:txBody>
+      </p:sp>
+    </p:spTree>
+    <p:extLst>
+      <p:ext uri="{BB962C8B-B14F-4D97-AF65-F5344CB8AC3E}">
+        <p14:creationId xmlns:p14="http://schemas.microsoft.com/office/powerpoint/2010/main" val="2255899240"/>
+      </p:ext>
+    </p:extLst>
+  </p:cSld>
+  <p:clrMapOvr>
+    <a:masterClrMapping/>
+  </p:clrMapOvr>
+</p:sld>
+</file>
+
+<file path=ppt/slides/slide7.xml><?xml version="1.0" encoding="utf-8"?>
+<p:sld xmlns:a="http://schemas.openxmlformats.org/drawingml/2006/main" xmlns:r="http://schemas.openxmlformats.org/officeDocument/2006/relationships" xmlns:p="http://schemas.openxmlformats.org/presentationml/2006/main">
+  <p:cSld>
+    <p:spTree>
+      <p:nvGrpSpPr>
+        <p:cNvPr id="1" name=""/>
+        <p:cNvGrpSpPr/>
+        <p:nvPr/>
+      </p:nvGrpSpPr>
+      <p:grpSpPr>
+        <a:xfrm>
+          <a:off x="0" y="0"/>
+          <a:ext cx="0" cy="0"/>
+          <a:chOff x="0" y="0"/>
+          <a:chExt cx="0" cy="0"/>
+        </a:xfrm>
+      </p:grpSpPr>
+      <p:sp>
+        <p:nvSpPr>
+          <p:cNvPr id="2" name="Title 1">
+            <a:extLst>
+              <a:ext uri="{FF2B5EF4-FFF2-40B4-BE49-F238E27FC236}">
+                <a16:creationId xmlns:a16="http://schemas.microsoft.com/office/drawing/2014/main" id="{C40A1173-C0F8-C29D-5921-9E01D72B0772}"/>
+              </a:ext>
+            </a:extLst>
+          </p:cNvPr>
+          <p:cNvSpPr>
+            <a:spLocks noGrp="1"/>
+          </p:cNvSpPr>
+          <p:nvPr>
+            <p:ph type="title"/>
+          </p:nvPr>
+        </p:nvSpPr>
+        <p:spPr/>
+        <p:txBody>
+          <a:bodyPr/>
+          <a:lstStyle/>
+          <a:p>
+            <a:r>
+              <a:rPr lang="en-IN" dirty="0">
+                <a:effectLst/>
+                <a:latin typeface="Helvetica" pitchFamily="2" charset="0"/>
+              </a:rPr>
+              <a:t>Python Install</a:t>
+            </a:r>
+            <a:endParaRPr lang="en-US" dirty="0"/>
+          </a:p>
+        </p:txBody>
+      </p:sp>
+      <p:sp>
+        <p:nvSpPr>
+          <p:cNvPr id="3" name="Content Placeholder 2">
+            <a:extLst>
+              <a:ext uri="{FF2B5EF4-FFF2-40B4-BE49-F238E27FC236}">
+                <a16:creationId xmlns:a16="http://schemas.microsoft.com/office/drawing/2014/main" id="{FC640C3F-4E52-E74C-407B-3CBE135741CC}"/>
+              </a:ext>
+            </a:extLst>
+          </p:cNvPr>
+          <p:cNvSpPr>
+            <a:spLocks noGrp="1"/>
+          </p:cNvSpPr>
+          <p:nvPr>
+            <p:ph idx="1"/>
+          </p:nvPr>
+        </p:nvSpPr>
+        <p:spPr/>
+        <p:txBody>
+          <a:bodyPr/>
+          <a:lstStyle/>
+          <a:p>
+            <a:r>
+              <a:rPr lang="en-US" dirty="0"/>
+              <a:t>https://</a:t>
+            </a:r>
+            <a:r>
+              <a:rPr lang="en-US" dirty="0" err="1"/>
+              <a:t>www.python.org</a:t>
+            </a:r>
+            <a:r>
+              <a:rPr lang="en-US" dirty="0"/>
+              <a:t>/downloads/</a:t>
+            </a:r>
+          </a:p>
+        </p:txBody>
+      </p:sp>
+      <p:sp>
+        <p:nvSpPr>
+          <p:cNvPr id="5" name="Footer Placeholder 5">
+            <a:extLst>
+              <a:ext uri="{FF2B5EF4-FFF2-40B4-BE49-F238E27FC236}">
+                <a16:creationId xmlns:a16="http://schemas.microsoft.com/office/drawing/2014/main" id="{7EF32F59-FBC3-C78A-0739-B741B462EA83}"/>
+              </a:ext>
+            </a:extLst>
+          </p:cNvPr>
+          <p:cNvSpPr>
+            <a:spLocks noGrp="1"/>
+          </p:cNvSpPr>
+          <p:nvPr>
+            <p:ph type="ftr" sz="quarter" idx="11"/>
+          </p:nvPr>
+        </p:nvSpPr>
+        <p:spPr>
+          <a:xfrm>
+            <a:off x="8077200" y="6321626"/>
+            <a:ext cx="4114800" cy="365125"/>
+          </a:xfrm>
+        </p:spPr>
+        <p:txBody>
+          <a:bodyPr/>
+          <a:lstStyle/>
+          <a:p>
+            <a:r>
+              <a:rPr lang="en-US" sz="1600" dirty="0">
+                <a:solidFill>
+                  <a:srgbClr val="FF0000"/>
+                </a:solidFill>
+              </a:rPr>
+              <a:t>R</a:t>
+            </a:r>
+            <a:r>
+              <a:rPr lang="en-US" dirty="0">
+                <a:solidFill>
+                  <a:srgbClr val="00B050"/>
+                </a:solidFill>
+              </a:rPr>
+              <a:t>hash</a:t>
+            </a:r>
+            <a:r>
+              <a:rPr lang="en-US" dirty="0"/>
+              <a:t> </a:t>
+            </a:r>
+            <a:r>
+              <a:rPr lang="en-US" dirty="0">
+                <a:solidFill>
+                  <a:srgbClr val="0432FF"/>
+                </a:solidFill>
+              </a:rPr>
+              <a:t>Algo</a:t>
+            </a:r>
+          </a:p>
+        </p:txBody>
+      </p:sp>
+    </p:spTree>
+    <p:extLst>
+      <p:ext uri="{BB962C8B-B14F-4D97-AF65-F5344CB8AC3E}">
+        <p14:creationId xmlns:p14="http://schemas.microsoft.com/office/powerpoint/2010/main" val="4220899129"/>
       </p:ext>
     </p:extLst>
   </p:cSld>
@@ -3743,4 +5525,299 @@
     </a:ext>
   </a:extLst>
 </a:theme>
+</file>
+
+<file path=ppt/theme/theme2.xml><?xml version="1.0" encoding="utf-8"?>
+<a:theme xmlns:a="http://schemas.openxmlformats.org/drawingml/2006/main" name="Office Theme">
+  <a:themeElements>
+    <a:clrScheme name="Office">
+      <a:dk1>
+        <a:sysClr val="windowText" lastClr="000000"/>
+      </a:dk1>
+      <a:lt1>
+        <a:sysClr val="window" lastClr="FFFFFF"/>
+      </a:lt1>
+      <a:dk2>
+        <a:srgbClr val="44546A"/>
+      </a:dk2>
+      <a:lt2>
+        <a:srgbClr val="E7E6E6"/>
+      </a:lt2>
+      <a:accent1>
+        <a:srgbClr val="4472C4"/>
+      </a:accent1>
+      <a:accent2>
+        <a:srgbClr val="ED7D31"/>
+      </a:accent2>
+      <a:accent3>
+        <a:srgbClr val="A5A5A5"/>
+      </a:accent3>
+      <a:accent4>
+        <a:srgbClr val="FFC000"/>
+      </a:accent4>
+      <a:accent5>
+        <a:srgbClr val="5B9BD5"/>
+      </a:accent5>
+      <a:accent6>
+        <a:srgbClr val="70AD47"/>
+      </a:accent6>
+      <a:hlink>
+        <a:srgbClr val="0563C1"/>
+      </a:hlink>
+      <a:folHlink>
+        <a:srgbClr val="954F72"/>
+      </a:folHlink>
+    </a:clrScheme>
+    <a:fontScheme name="Office">
+      <a:majorFont>
+        <a:latin typeface="Calibri Light" panose="020F0302020204030204"/>
+        <a:ea typeface=""/>
+        <a:cs typeface=""/>
+        <a:font script="Jpan" typeface="游ゴシック Light"/>
+        <a:font script="Hang" typeface="맑은 고딕"/>
+        <a:font script="Hans" typeface="等线 Light"/>
+        <a:font script="Hant" typeface="新細明體"/>
+        <a:font script="Arab" typeface="Times New Roman"/>
+        <a:font script="Hebr" typeface="Times New Roman"/>
+        <a:font script="Thai" typeface="Angsana New"/>
+        <a:font script="Ethi" typeface="Nyala"/>
+        <a:font script="Beng" typeface="Vrinda"/>
+        <a:font script="Gujr" typeface="Shruti"/>
+        <a:font script="Khmr" typeface="MoolBoran"/>
+        <a:font script="Knda" typeface="Tunga"/>
+        <a:font script="Guru" typeface="Raavi"/>
+        <a:font script="Cans" typeface="Euphemia"/>
+        <a:font script="Cher" typeface="Plantagenet Cherokee"/>
+        <a:font script="Yiii" typeface="Microsoft Yi Baiti"/>
+        <a:font script="Tibt" typeface="Microsoft Himalaya"/>
+        <a:font script="Thaa" typeface="MV Boli"/>
+        <a:font script="Deva" typeface="Mangal"/>
+        <a:font script="Telu" typeface="Gautami"/>
+        <a:font script="Taml" typeface="Latha"/>
+        <a:font script="Syrc" typeface="Estrangelo Edessa"/>
+        <a:font script="Orya" typeface="Kalinga"/>
+        <a:font script="Mlym" typeface="Kartika"/>
+        <a:font script="Laoo" typeface="DokChampa"/>
+        <a:font script="Sinh" typeface="Iskoola Pota"/>
+        <a:font script="Mong" typeface="Mongolian Baiti"/>
+        <a:font script="Viet" typeface="Times New Roman"/>
+        <a:font script="Uigh" typeface="Microsoft Uighur"/>
+        <a:font script="Geor" typeface="Sylfaen"/>
+        <a:font script="Armn" typeface="Arial"/>
+        <a:font script="Bugi" typeface="Leelawadee UI"/>
+        <a:font script="Bopo" typeface="Microsoft JhengHei"/>
+        <a:font script="Java" typeface="Javanese Text"/>
+        <a:font script="Lisu" typeface="Segoe UI"/>
+        <a:font script="Mymr" typeface="Myanmar Text"/>
+        <a:font script="Nkoo" typeface="Ebrima"/>
+        <a:font script="Olck" typeface="Nirmala UI"/>
+        <a:font script="Osma" typeface="Ebrima"/>
+        <a:font script="Phag" typeface="Phagspa"/>
+        <a:font script="Syrn" typeface="Estrangelo Edessa"/>
+        <a:font script="Syrj" typeface="Estrangelo Edessa"/>
+        <a:font script="Syre" typeface="Estrangelo Edessa"/>
+        <a:font script="Sora" typeface="Nirmala UI"/>
+        <a:font script="Tale" typeface="Microsoft Tai Le"/>
+        <a:font script="Talu" typeface="Microsoft New Tai Lue"/>
+        <a:font script="Tfng" typeface="Ebrima"/>
+      </a:majorFont>
+      <a:minorFont>
+        <a:latin typeface="Calibri" panose="020F0502020204030204"/>
+        <a:ea typeface=""/>
+        <a:cs typeface=""/>
+        <a:font script="Jpan" typeface="游ゴシック"/>
+        <a:font script="Hang" typeface="맑은 고딕"/>
+        <a:font script="Hans" typeface="等线"/>
+        <a:font script="Hant" typeface="新細明體"/>
+        <a:font script="Arab" typeface="Arial"/>
+        <a:font script="Hebr" typeface="Arial"/>
+        <a:font script="Thai" typeface="Cordia New"/>
+        <a:font script="Ethi" typeface="Nyala"/>
+        <a:font script="Beng" typeface="Vrinda"/>
+        <a:font script="Gujr" typeface="Shruti"/>
+        <a:font script="Khmr" typeface="DaunPenh"/>
+        <a:font script="Knda" typeface="Tunga"/>
+        <a:font script="Guru" typeface="Raavi"/>
+        <a:font script="Cans" typeface="Euphemia"/>
+        <a:font script="Cher" typeface="Plantagenet Cherokee"/>
+        <a:font script="Yiii" typeface="Microsoft Yi Baiti"/>
+        <a:font script="Tibt" typeface="Microsoft Himalaya"/>
+        <a:font script="Thaa" typeface="MV Boli"/>
+        <a:font script="Deva" typeface="Mangal"/>
+        <a:font script="Telu" typeface="Gautami"/>
+        <a:font script="Taml" typeface="Latha"/>
+        <a:font script="Syrc" typeface="Estrangelo Edessa"/>
+        <a:font script="Orya" typeface="Kalinga"/>
+        <a:font script="Mlym" typeface="Kartika"/>
+        <a:font script="Laoo" typeface="DokChampa"/>
+        <a:font script="Sinh" typeface="Iskoola Pota"/>
+        <a:font script="Mong" typeface="Mongolian Baiti"/>
+        <a:font script="Viet" typeface="Arial"/>
+        <a:font script="Uigh" typeface="Microsoft Uighur"/>
+        <a:font script="Geor" typeface="Sylfaen"/>
+        <a:font script="Armn" typeface="Arial"/>
+        <a:font script="Bugi" typeface="Leelawadee UI"/>
+        <a:font script="Bopo" typeface="Microsoft JhengHei"/>
+        <a:font script="Java" typeface="Javanese Text"/>
+        <a:font script="Lisu" typeface="Segoe UI"/>
+        <a:font script="Mymr" typeface="Myanmar Text"/>
+        <a:font script="Nkoo" typeface="Ebrima"/>
+        <a:font script="Olck" typeface="Nirmala UI"/>
+        <a:font script="Osma" typeface="Ebrima"/>
+        <a:font script="Phag" typeface="Phagspa"/>
+        <a:font script="Syrn" typeface="Estrangelo Edessa"/>
+        <a:font script="Syrj" typeface="Estrangelo Edessa"/>
+        <a:font script="Syre" typeface="Estrangelo Edessa"/>
+        <a:font script="Sora" typeface="Nirmala UI"/>
+        <a:font script="Tale" typeface="Microsoft Tai Le"/>
+        <a:font script="Talu" typeface="Microsoft New Tai Lue"/>
+        <a:font script="Tfng" typeface="Ebrima"/>
+      </a:minorFont>
+    </a:fontScheme>
+    <a:fmtScheme name="Office">
+      <a:fillStyleLst>
+        <a:solidFill>
+          <a:schemeClr val="phClr"/>
+        </a:solidFill>
+        <a:gradFill rotWithShape="1">
+          <a:gsLst>
+            <a:gs pos="0">
+              <a:schemeClr val="phClr">
+                <a:lumMod val="110000"/>
+                <a:satMod val="105000"/>
+                <a:tint val="67000"/>
+              </a:schemeClr>
+            </a:gs>
+            <a:gs pos="50000">
+              <a:schemeClr val="phClr">
+                <a:lumMod val="105000"/>
+                <a:satMod val="103000"/>
+                <a:tint val="73000"/>
+              </a:schemeClr>
+            </a:gs>
+            <a:gs pos="100000">
+              <a:schemeClr val="phClr">
+                <a:lumMod val="105000"/>
+                <a:satMod val="109000"/>
+                <a:tint val="81000"/>
+              </a:schemeClr>
+            </a:gs>
+          </a:gsLst>
+          <a:lin ang="5400000" scaled="0"/>
+        </a:gradFill>
+        <a:gradFill rotWithShape="1">
+          <a:gsLst>
+            <a:gs pos="0">
+              <a:schemeClr val="phClr">
+                <a:satMod val="103000"/>
+                <a:lumMod val="102000"/>
+                <a:tint val="94000"/>
+              </a:schemeClr>
+            </a:gs>
+            <a:gs pos="50000">
+              <a:schemeClr val="phClr">
+                <a:satMod val="110000"/>
+                <a:lumMod val="100000"/>
+                <a:shade val="100000"/>
+              </a:schemeClr>
+            </a:gs>
+            <a:gs pos="100000">
+              <a:schemeClr val="phClr">
+                <a:lumMod val="99000"/>
+                <a:satMod val="120000"/>
+                <a:shade val="78000"/>
+              </a:schemeClr>
+            </a:gs>
+          </a:gsLst>
+          <a:lin ang="5400000" scaled="0"/>
+        </a:gradFill>
+      </a:fillStyleLst>
+      <a:lnStyleLst>
+        <a:ln w="6350" cap="flat" cmpd="sng" algn="ctr">
+          <a:solidFill>
+            <a:schemeClr val="phClr"/>
+          </a:solidFill>
+          <a:prstDash val="solid"/>
+          <a:miter lim="800000"/>
+        </a:ln>
+        <a:ln w="12700" cap="flat" cmpd="sng" algn="ctr">
+          <a:solidFill>
+            <a:schemeClr val="phClr"/>
+          </a:solidFill>
+          <a:prstDash val="solid"/>
+          <a:miter lim="800000"/>
+        </a:ln>
+        <a:ln w="19050" cap="flat" cmpd="sng" algn="ctr">
+          <a:solidFill>
+            <a:schemeClr val="phClr"/>
+          </a:solidFill>
+          <a:prstDash val="solid"/>
+          <a:miter lim="800000"/>
+        </a:ln>
+      </a:lnStyleLst>
+      <a:effectStyleLst>
+        <a:effectStyle>
+          <a:effectLst/>
+        </a:effectStyle>
+        <a:effectStyle>
+          <a:effectLst/>
+        </a:effectStyle>
+        <a:effectStyle>
+          <a:effectLst>
+            <a:outerShdw blurRad="57150" dist="19050" dir="5400000" algn="ctr" rotWithShape="0">
+              <a:srgbClr val="000000">
+                <a:alpha val="63000"/>
+              </a:srgbClr>
+            </a:outerShdw>
+          </a:effectLst>
+        </a:effectStyle>
+      </a:effectStyleLst>
+      <a:bgFillStyleLst>
+        <a:solidFill>
+          <a:schemeClr val="phClr"/>
+        </a:solidFill>
+        <a:solidFill>
+          <a:schemeClr val="phClr">
+            <a:tint val="95000"/>
+            <a:satMod val="170000"/>
+          </a:schemeClr>
+        </a:solidFill>
+        <a:gradFill rotWithShape="1">
+          <a:gsLst>
+            <a:gs pos="0">
+              <a:schemeClr val="phClr">
+                <a:tint val="93000"/>
+                <a:satMod val="150000"/>
+                <a:shade val="98000"/>
+                <a:lumMod val="102000"/>
+              </a:schemeClr>
+            </a:gs>
+            <a:gs pos="50000">
+              <a:schemeClr val="phClr">
+                <a:tint val="98000"/>
+                <a:satMod val="130000"/>
+                <a:shade val="90000"/>
+                <a:lumMod val="103000"/>
+              </a:schemeClr>
+            </a:gs>
+            <a:gs pos="100000">
+              <a:schemeClr val="phClr">
+                <a:shade val="63000"/>
+                <a:satMod val="120000"/>
+              </a:schemeClr>
+            </a:gs>
+          </a:gsLst>
+          <a:lin ang="5400000" scaled="0"/>
+        </a:gradFill>
+      </a:bgFillStyleLst>
+    </a:fmtScheme>
+  </a:themeElements>
+  <a:objectDefaults/>
+  <a:extraClrSchemeLst/>
+  <a:extLst>
+    <a:ext uri="{05A4C25C-085E-4340-85A3-A5531E510DB2}">
+      <thm15:themeFamily xmlns:thm15="http://schemas.microsoft.com/office/thememl/2012/main" name="Office Theme" id="{62F939B6-93AF-4DB8-9C6B-D6C7DFDC589F}" vid="{4A3C46E8-61CC-4603-A589-7422A47A8E4A}"/>
+    </a:ext>
+  </a:extLst>
+</a:theme>
 </file>
</xml_diff>